<commit_message>
fix: updated dependencies and readme figs
</commit_message>
<xml_diff>
--- a/inst/figs/original.pptx
+++ b/inst/figs/original.pptx
@@ -6,6 +6,7 @@
   </p:sldMasterIdLst>
   <p:sldIdLst>
     <p:sldId id="256" r:id="rId2"/>
+    <p:sldId id="257" r:id="rId3"/>
   </p:sldIdLst>
   <p:sldSz cx="12192000" cy="6858000"/>
   <p:notesSz cx="6858000" cy="9144000"/>
@@ -3518,6 +3519,488 @@
 </p:sld>
 </file>
 
+<file path=ppt/slides/slide2.xml><?xml version="1.0" encoding="utf-8"?>
+<p:sld xmlns:a="http://schemas.openxmlformats.org/drawingml/2006/main" xmlns:r="http://schemas.openxmlformats.org/officeDocument/2006/relationships" xmlns:p="http://schemas.openxmlformats.org/presentationml/2006/main">
+  <p:cSld>
+    <p:spTree>
+      <p:nvGrpSpPr>
+        <p:cNvPr id="1" name=""/>
+        <p:cNvGrpSpPr/>
+        <p:nvPr/>
+      </p:nvGrpSpPr>
+      <p:grpSpPr>
+        <a:xfrm>
+          <a:off x="0" y="0"/>
+          <a:ext cx="0" cy="0"/>
+          <a:chOff x="0" y="0"/>
+          <a:chExt cx="0" cy="0"/>
+        </a:xfrm>
+      </p:grpSpPr>
+      <p:pic>
+        <p:nvPicPr>
+          <p:cNvPr id="8" name="Picture 7">
+            <a:extLst>
+              <a:ext uri="{FF2B5EF4-FFF2-40B4-BE49-F238E27FC236}">
+                <a16:creationId xmlns:a16="http://schemas.microsoft.com/office/drawing/2014/main" id="{98858E7A-C88F-5053-5E52-2B417150CED6}"/>
+              </a:ext>
+            </a:extLst>
+          </p:cNvPr>
+          <p:cNvPicPr>
+            <a:picLocks noChangeAspect="1"/>
+          </p:cNvPicPr>
+          <p:nvPr/>
+        </p:nvPicPr>
+        <p:blipFill>
+          <a:blip r:embed="rId2"/>
+          <a:stretch>
+            <a:fillRect/>
+          </a:stretch>
+        </p:blipFill>
+        <p:spPr>
+          <a:xfrm>
+            <a:off x="1736835" y="1981531"/>
+            <a:ext cx="7772400" cy="3294329"/>
+          </a:xfrm>
+          <a:prstGeom prst="rect">
+            <a:avLst/>
+          </a:prstGeom>
+        </p:spPr>
+      </p:pic>
+      <p:sp>
+        <p:nvSpPr>
+          <p:cNvPr id="5" name="Rectangle 4">
+            <a:extLst>
+              <a:ext uri="{FF2B5EF4-FFF2-40B4-BE49-F238E27FC236}">
+                <a16:creationId xmlns:a16="http://schemas.microsoft.com/office/drawing/2014/main" id="{865C2217-811A-F73B-562C-B70F8C6B6318}"/>
+              </a:ext>
+            </a:extLst>
+          </p:cNvPr>
+          <p:cNvSpPr/>
+          <p:nvPr/>
+        </p:nvSpPr>
+        <p:spPr>
+          <a:xfrm>
+            <a:off x="4866291" y="3244551"/>
+            <a:ext cx="231227" cy="189186"/>
+          </a:xfrm>
+          <a:prstGeom prst="rect">
+            <a:avLst/>
+          </a:prstGeom>
+          <a:solidFill>
+            <a:srgbClr val="FF0000">
+              <a:alpha val="29020"/>
+            </a:srgbClr>
+          </a:solidFill>
+        </p:spPr>
+        <p:style>
+          <a:lnRef idx="2">
+            <a:schemeClr val="accent1">
+              <a:shade val="15000"/>
+            </a:schemeClr>
+          </a:lnRef>
+          <a:fillRef idx="1">
+            <a:schemeClr val="accent1"/>
+          </a:fillRef>
+          <a:effectRef idx="0">
+            <a:schemeClr val="accent1"/>
+          </a:effectRef>
+          <a:fontRef idx="minor">
+            <a:schemeClr val="lt1"/>
+          </a:fontRef>
+        </p:style>
+        <p:txBody>
+          <a:bodyPr rtlCol="0" anchor="ctr"/>
+          <a:lstStyle/>
+          <a:p>
+            <a:pPr algn="ctr"/>
+            <a:endParaRPr lang="en-US"/>
+          </a:p>
+        </p:txBody>
+      </p:sp>
+      <p:cxnSp>
+        <p:nvCxnSpPr>
+          <p:cNvPr id="6" name="Straight Arrow Connector 5">
+            <a:extLst>
+              <a:ext uri="{FF2B5EF4-FFF2-40B4-BE49-F238E27FC236}">
+                <a16:creationId xmlns:a16="http://schemas.microsoft.com/office/drawing/2014/main" id="{277D8F22-0107-AE42-EA3B-5E570A494165}"/>
+              </a:ext>
+            </a:extLst>
+          </p:cNvPr>
+          <p:cNvCxnSpPr>
+            <a:cxnSpLocks/>
+            <a:stCxn id="7" idx="1"/>
+          </p:cNvCxnSpPr>
+          <p:nvPr/>
+        </p:nvCxnSpPr>
+        <p:spPr>
+          <a:xfrm flipH="1" flipV="1">
+            <a:off x="5097518" y="3339144"/>
+            <a:ext cx="1881350" cy="426404"/>
+          </a:xfrm>
+          <a:prstGeom prst="straightConnector1">
+            <a:avLst/>
+          </a:prstGeom>
+          <a:ln w="57150">
+            <a:solidFill>
+              <a:srgbClr val="C00000"/>
+            </a:solidFill>
+            <a:tailEnd type="triangle"/>
+          </a:ln>
+        </p:spPr>
+        <p:style>
+          <a:lnRef idx="1">
+            <a:schemeClr val="accent1"/>
+          </a:lnRef>
+          <a:fillRef idx="0">
+            <a:schemeClr val="accent1"/>
+          </a:fillRef>
+          <a:effectRef idx="0">
+            <a:schemeClr val="accent1"/>
+          </a:effectRef>
+          <a:fontRef idx="minor">
+            <a:schemeClr val="tx1"/>
+          </a:fontRef>
+        </p:style>
+      </p:cxnSp>
+      <p:sp>
+        <p:nvSpPr>
+          <p:cNvPr id="7" name="TextBox 6">
+            <a:extLst>
+              <a:ext uri="{FF2B5EF4-FFF2-40B4-BE49-F238E27FC236}">
+                <a16:creationId xmlns:a16="http://schemas.microsoft.com/office/drawing/2014/main" id="{60163020-AB25-EC73-BADF-C2371F398399}"/>
+              </a:ext>
+            </a:extLst>
+          </p:cNvPr>
+          <p:cNvSpPr txBox="1"/>
+          <p:nvPr/>
+        </p:nvSpPr>
+        <p:spPr>
+          <a:xfrm>
+            <a:off x="6978868" y="3580882"/>
+            <a:ext cx="2434449" cy="369332"/>
+          </a:xfrm>
+          <a:prstGeom prst="rect">
+            <a:avLst/>
+          </a:prstGeom>
+          <a:noFill/>
+          <a:ln w="57150">
+            <a:solidFill>
+              <a:srgbClr val="C00000"/>
+            </a:solidFill>
+          </a:ln>
+        </p:spPr>
+        <p:txBody>
+          <a:bodyPr wrap="none" rtlCol="0">
+            <a:spAutoFit/>
+          </a:bodyPr>
+          <a:lstStyle/>
+          <a:p>
+            <a:r>
+              <a:rPr lang="en-US" b="1" dirty="0"/>
+              <a:t>Recommended Settings</a:t>
+            </a:r>
+          </a:p>
+        </p:txBody>
+      </p:sp>
+      <p:sp>
+        <p:nvSpPr>
+          <p:cNvPr id="9" name="Rectangle 8">
+            <a:extLst>
+              <a:ext uri="{FF2B5EF4-FFF2-40B4-BE49-F238E27FC236}">
+                <a16:creationId xmlns:a16="http://schemas.microsoft.com/office/drawing/2014/main" id="{10E87089-BE63-3AF8-83FF-410F59162E1E}"/>
+              </a:ext>
+            </a:extLst>
+          </p:cNvPr>
+          <p:cNvSpPr/>
+          <p:nvPr/>
+        </p:nvSpPr>
+        <p:spPr>
+          <a:xfrm>
+            <a:off x="4866291" y="3486289"/>
+            <a:ext cx="231227" cy="189186"/>
+          </a:xfrm>
+          <a:prstGeom prst="rect">
+            <a:avLst/>
+          </a:prstGeom>
+          <a:solidFill>
+            <a:srgbClr val="FF0000">
+              <a:alpha val="29020"/>
+            </a:srgbClr>
+          </a:solidFill>
+        </p:spPr>
+        <p:style>
+          <a:lnRef idx="2">
+            <a:schemeClr val="accent1">
+              <a:shade val="15000"/>
+            </a:schemeClr>
+          </a:lnRef>
+          <a:fillRef idx="1">
+            <a:schemeClr val="accent1"/>
+          </a:fillRef>
+          <a:effectRef idx="0">
+            <a:schemeClr val="accent1"/>
+          </a:effectRef>
+          <a:fontRef idx="minor">
+            <a:schemeClr val="lt1"/>
+          </a:fontRef>
+        </p:style>
+        <p:txBody>
+          <a:bodyPr rtlCol="0" anchor="ctr"/>
+          <a:lstStyle/>
+          <a:p>
+            <a:pPr algn="ctr"/>
+            <a:endParaRPr lang="en-US"/>
+          </a:p>
+        </p:txBody>
+      </p:sp>
+      <p:sp>
+        <p:nvSpPr>
+          <p:cNvPr id="10" name="Rectangle 9">
+            <a:extLst>
+              <a:ext uri="{FF2B5EF4-FFF2-40B4-BE49-F238E27FC236}">
+                <a16:creationId xmlns:a16="http://schemas.microsoft.com/office/drawing/2014/main" id="{5A9AD228-1290-A996-A877-476A057339C1}"/>
+              </a:ext>
+            </a:extLst>
+          </p:cNvPr>
+          <p:cNvSpPr/>
+          <p:nvPr/>
+        </p:nvSpPr>
+        <p:spPr>
+          <a:xfrm>
+            <a:off x="4866291" y="4505793"/>
+            <a:ext cx="231227" cy="189186"/>
+          </a:xfrm>
+          <a:prstGeom prst="rect">
+            <a:avLst/>
+          </a:prstGeom>
+          <a:solidFill>
+            <a:srgbClr val="FF0000">
+              <a:alpha val="29020"/>
+            </a:srgbClr>
+          </a:solidFill>
+        </p:spPr>
+        <p:style>
+          <a:lnRef idx="2">
+            <a:schemeClr val="accent1">
+              <a:shade val="15000"/>
+            </a:schemeClr>
+          </a:lnRef>
+          <a:fillRef idx="1">
+            <a:schemeClr val="accent1"/>
+          </a:fillRef>
+          <a:effectRef idx="0">
+            <a:schemeClr val="accent1"/>
+          </a:effectRef>
+          <a:fontRef idx="minor">
+            <a:schemeClr val="lt1"/>
+          </a:fontRef>
+        </p:style>
+        <p:txBody>
+          <a:bodyPr rtlCol="0" anchor="ctr"/>
+          <a:lstStyle/>
+          <a:p>
+            <a:pPr algn="ctr"/>
+            <a:endParaRPr lang="en-US"/>
+          </a:p>
+        </p:txBody>
+      </p:sp>
+      <p:sp>
+        <p:nvSpPr>
+          <p:cNvPr id="12" name="Rectangle 11">
+            <a:extLst>
+              <a:ext uri="{FF2B5EF4-FFF2-40B4-BE49-F238E27FC236}">
+                <a16:creationId xmlns:a16="http://schemas.microsoft.com/office/drawing/2014/main" id="{E12A3D5A-E32B-2618-1B3A-71C22C29A787}"/>
+              </a:ext>
+            </a:extLst>
+          </p:cNvPr>
+          <p:cNvSpPr/>
+          <p:nvPr/>
+        </p:nvSpPr>
+        <p:spPr>
+          <a:xfrm>
+            <a:off x="3268718" y="1981531"/>
+            <a:ext cx="1187668" cy="211985"/>
+          </a:xfrm>
+          <a:prstGeom prst="rect">
+            <a:avLst/>
+          </a:prstGeom>
+          <a:solidFill>
+            <a:srgbClr val="FF0000">
+              <a:alpha val="29020"/>
+            </a:srgbClr>
+          </a:solidFill>
+        </p:spPr>
+        <p:style>
+          <a:lnRef idx="2">
+            <a:schemeClr val="accent1">
+              <a:shade val="15000"/>
+            </a:schemeClr>
+          </a:lnRef>
+          <a:fillRef idx="1">
+            <a:schemeClr val="accent1"/>
+          </a:fillRef>
+          <a:effectRef idx="0">
+            <a:schemeClr val="accent1"/>
+          </a:effectRef>
+          <a:fontRef idx="minor">
+            <a:schemeClr val="lt1"/>
+          </a:fontRef>
+        </p:style>
+        <p:txBody>
+          <a:bodyPr rtlCol="0" anchor="ctr"/>
+          <a:lstStyle/>
+          <a:p>
+            <a:pPr algn="ctr"/>
+            <a:endParaRPr lang="en-US"/>
+          </a:p>
+        </p:txBody>
+      </p:sp>
+      <p:cxnSp>
+        <p:nvCxnSpPr>
+          <p:cNvPr id="14" name="Straight Arrow Connector 13">
+            <a:extLst>
+              <a:ext uri="{FF2B5EF4-FFF2-40B4-BE49-F238E27FC236}">
+                <a16:creationId xmlns:a16="http://schemas.microsoft.com/office/drawing/2014/main" id="{A01F71FB-2221-969C-0868-595EEFFF9702}"/>
+              </a:ext>
+            </a:extLst>
+          </p:cNvPr>
+          <p:cNvCxnSpPr>
+            <a:cxnSpLocks/>
+          </p:cNvCxnSpPr>
+          <p:nvPr/>
+        </p:nvCxnSpPr>
+        <p:spPr>
+          <a:xfrm flipH="1" flipV="1">
+            <a:off x="5097518" y="3599643"/>
+            <a:ext cx="1881350" cy="165905"/>
+          </a:xfrm>
+          <a:prstGeom prst="straightConnector1">
+            <a:avLst/>
+          </a:prstGeom>
+          <a:ln w="57150">
+            <a:solidFill>
+              <a:srgbClr val="C00000"/>
+            </a:solidFill>
+            <a:tailEnd type="triangle"/>
+          </a:ln>
+        </p:spPr>
+        <p:style>
+          <a:lnRef idx="1">
+            <a:schemeClr val="accent1"/>
+          </a:lnRef>
+          <a:fillRef idx="0">
+            <a:schemeClr val="accent1"/>
+          </a:fillRef>
+          <a:effectRef idx="0">
+            <a:schemeClr val="accent1"/>
+          </a:effectRef>
+          <a:fontRef idx="minor">
+            <a:schemeClr val="tx1"/>
+          </a:fontRef>
+        </p:style>
+      </p:cxnSp>
+      <p:cxnSp>
+        <p:nvCxnSpPr>
+          <p:cNvPr id="16" name="Straight Arrow Connector 15">
+            <a:extLst>
+              <a:ext uri="{FF2B5EF4-FFF2-40B4-BE49-F238E27FC236}">
+                <a16:creationId xmlns:a16="http://schemas.microsoft.com/office/drawing/2014/main" id="{E6353430-242B-3F64-F658-367A428D7DF2}"/>
+              </a:ext>
+            </a:extLst>
+          </p:cNvPr>
+          <p:cNvCxnSpPr>
+            <a:cxnSpLocks/>
+          </p:cNvCxnSpPr>
+          <p:nvPr/>
+        </p:nvCxnSpPr>
+        <p:spPr>
+          <a:xfrm flipH="1">
+            <a:off x="5097518" y="3797079"/>
+            <a:ext cx="1881350" cy="803307"/>
+          </a:xfrm>
+          <a:prstGeom prst="straightConnector1">
+            <a:avLst/>
+          </a:prstGeom>
+          <a:ln w="57150">
+            <a:solidFill>
+              <a:srgbClr val="C00000"/>
+            </a:solidFill>
+            <a:tailEnd type="triangle"/>
+          </a:ln>
+        </p:spPr>
+        <p:style>
+          <a:lnRef idx="1">
+            <a:schemeClr val="accent1"/>
+          </a:lnRef>
+          <a:fillRef idx="0">
+            <a:schemeClr val="accent1"/>
+          </a:fillRef>
+          <a:effectRef idx="0">
+            <a:schemeClr val="accent1"/>
+          </a:effectRef>
+          <a:fontRef idx="minor">
+            <a:schemeClr val="tx1"/>
+          </a:fontRef>
+        </p:style>
+      </p:cxnSp>
+      <p:cxnSp>
+        <p:nvCxnSpPr>
+          <p:cNvPr id="22" name="Straight Arrow Connector 21">
+            <a:extLst>
+              <a:ext uri="{FF2B5EF4-FFF2-40B4-BE49-F238E27FC236}">
+                <a16:creationId xmlns:a16="http://schemas.microsoft.com/office/drawing/2014/main" id="{5FDF423E-4E57-6079-84BA-9BB26B6EE469}"/>
+              </a:ext>
+            </a:extLst>
+          </p:cNvPr>
+          <p:cNvCxnSpPr>
+            <a:cxnSpLocks/>
+            <a:stCxn id="7" idx="1"/>
+          </p:cNvCxnSpPr>
+          <p:nvPr/>
+        </p:nvCxnSpPr>
+        <p:spPr>
+          <a:xfrm flipH="1" flipV="1">
+            <a:off x="4466898" y="2067392"/>
+            <a:ext cx="2511970" cy="1698156"/>
+          </a:xfrm>
+          <a:prstGeom prst="straightConnector1">
+            <a:avLst/>
+          </a:prstGeom>
+          <a:ln w="57150">
+            <a:solidFill>
+              <a:srgbClr val="C00000"/>
+            </a:solidFill>
+            <a:tailEnd type="triangle"/>
+          </a:ln>
+        </p:spPr>
+        <p:style>
+          <a:lnRef idx="1">
+            <a:schemeClr val="accent1"/>
+          </a:lnRef>
+          <a:fillRef idx="0">
+            <a:schemeClr val="accent1"/>
+          </a:fillRef>
+          <a:effectRef idx="0">
+            <a:schemeClr val="accent1"/>
+          </a:effectRef>
+          <a:fontRef idx="minor">
+            <a:schemeClr val="tx1"/>
+          </a:fontRef>
+        </p:style>
+      </p:cxnSp>
+    </p:spTree>
+    <p:extLst>
+      <p:ext uri="{BB962C8B-B14F-4D97-AF65-F5344CB8AC3E}">
+        <p14:creationId xmlns:p14="http://schemas.microsoft.com/office/powerpoint/2010/main" val="3984936471"/>
+      </p:ext>
+    </p:extLst>
+  </p:cSld>
+  <p:clrMapOvr>
+    <a:masterClrMapping/>
+  </p:clrMapOvr>
+</p:sld>
+</file>
+
 <file path=ppt/theme/theme1.xml><?xml version="1.0" encoding="utf-8"?>
 <a:theme xmlns:a="http://schemas.openxmlformats.org/drawingml/2006/main" name="Office Theme">
   <a:themeElements>

</xml_diff>